<commit_message>
Update Du papier au numérique la gestion des caractères grecs ligaturés_v2.pptx
</commit_message>
<xml_diff>
--- a/JE/Du papier au numérique la gestion des caractères grecs ligaturés_v2.pptx
+++ b/JE/Du papier au numérique la gestion des caractères grecs ligaturés_v2.pptx
@@ -243,7 +243,7 @@
           <a:p>
             <a:fld id="{F699991C-361E-EA40-B5C3-147A8933D896}" type="datetimeFigureOut">
               <a:rPr lang="fr-FR" smtClean="0"/>
-              <a:t>24/08/2022</a:t>
+              <a:t>27/08/2022</a:t>
             </a:fld>
             <a:endParaRPr lang="fr-FR"/>
           </a:p>
@@ -285,7 +285,7 @@
           <a:p>
             <a:fld id="{596509D5-3574-EE46-B46C-156665145D44}" type="slidenum">
               <a:rPr lang="fr-FR" smtClean="0"/>
-              <a:t>‹N°›</a:t>
+              <a:t>‹#›</a:t>
             </a:fld>
             <a:endParaRPr lang="fr-FR"/>
           </a:p>
@@ -389,7 +389,7 @@
           <a:p>
             <a:fld id="{F699991C-361E-EA40-B5C3-147A8933D896}" type="datetimeFigureOut">
               <a:rPr lang="fr-FR" smtClean="0"/>
-              <a:t>24/08/2022</a:t>
+              <a:t>27/08/2022</a:t>
             </a:fld>
             <a:endParaRPr lang="fr-FR"/>
           </a:p>
@@ -431,7 +431,7 @@
           <a:p>
             <a:fld id="{596509D5-3574-EE46-B46C-156665145D44}" type="slidenum">
               <a:rPr lang="fr-FR" smtClean="0"/>
-              <a:t>‹N°›</a:t>
+              <a:t>‹#›</a:t>
             </a:fld>
             <a:endParaRPr lang="fr-FR"/>
           </a:p>
@@ -545,7 +545,7 @@
           <a:p>
             <a:fld id="{F699991C-361E-EA40-B5C3-147A8933D896}" type="datetimeFigureOut">
               <a:rPr lang="fr-FR" smtClean="0"/>
-              <a:t>24/08/2022</a:t>
+              <a:t>27/08/2022</a:t>
             </a:fld>
             <a:endParaRPr lang="fr-FR"/>
           </a:p>
@@ -587,7 +587,7 @@
           <a:p>
             <a:fld id="{596509D5-3574-EE46-B46C-156665145D44}" type="slidenum">
               <a:rPr lang="fr-FR" smtClean="0"/>
-              <a:t>‹N°›</a:t>
+              <a:t>‹#›</a:t>
             </a:fld>
             <a:endParaRPr lang="fr-FR"/>
           </a:p>
@@ -691,7 +691,7 @@
           <a:p>
             <a:fld id="{F699991C-361E-EA40-B5C3-147A8933D896}" type="datetimeFigureOut">
               <a:rPr lang="fr-FR" smtClean="0"/>
-              <a:t>24/08/2022</a:t>
+              <a:t>27/08/2022</a:t>
             </a:fld>
             <a:endParaRPr lang="fr-FR"/>
           </a:p>
@@ -733,7 +733,7 @@
           <a:p>
             <a:fld id="{596509D5-3574-EE46-B46C-156665145D44}" type="slidenum">
               <a:rPr lang="fr-FR" smtClean="0"/>
-              <a:t>‹N°›</a:t>
+              <a:t>‹#›</a:t>
             </a:fld>
             <a:endParaRPr lang="fr-FR"/>
           </a:p>
@@ -940,7 +940,7 @@
           <a:p>
             <a:fld id="{F699991C-361E-EA40-B5C3-147A8933D896}" type="datetimeFigureOut">
               <a:rPr lang="fr-FR" smtClean="0"/>
-              <a:t>24/08/2022</a:t>
+              <a:t>27/08/2022</a:t>
             </a:fld>
             <a:endParaRPr lang="fr-FR"/>
           </a:p>
@@ -982,7 +982,7 @@
           <a:p>
             <a:fld id="{596509D5-3574-EE46-B46C-156665145D44}" type="slidenum">
               <a:rPr lang="fr-FR" smtClean="0"/>
-              <a:t>‹N°›</a:t>
+              <a:t>‹#›</a:t>
             </a:fld>
             <a:endParaRPr lang="fr-FR"/>
           </a:p>
@@ -1124,7 +1124,7 @@
           <a:p>
             <a:fld id="{F699991C-361E-EA40-B5C3-147A8933D896}" type="datetimeFigureOut">
               <a:rPr lang="fr-FR" smtClean="0"/>
-              <a:t>24/08/2022</a:t>
+              <a:t>27/08/2022</a:t>
             </a:fld>
             <a:endParaRPr lang="fr-FR"/>
           </a:p>
@@ -1166,7 +1166,7 @@
           <a:p>
             <a:fld id="{596509D5-3574-EE46-B46C-156665145D44}" type="slidenum">
               <a:rPr lang="fr-FR" smtClean="0"/>
-              <a:t>‹N°›</a:t>
+              <a:t>‹#›</a:t>
             </a:fld>
             <a:endParaRPr lang="fr-FR"/>
           </a:p>
@@ -1453,7 +1453,7 @@
           <a:p>
             <a:fld id="{F699991C-361E-EA40-B5C3-147A8933D896}" type="datetimeFigureOut">
               <a:rPr lang="fr-FR" smtClean="0"/>
-              <a:t>24/08/2022</a:t>
+              <a:t>27/08/2022</a:t>
             </a:fld>
             <a:endParaRPr lang="fr-FR"/>
           </a:p>
@@ -1495,7 +1495,7 @@
           <a:p>
             <a:fld id="{596509D5-3574-EE46-B46C-156665145D44}" type="slidenum">
               <a:rPr lang="fr-FR" smtClean="0"/>
-              <a:t>‹N°›</a:t>
+              <a:t>‹#›</a:t>
             </a:fld>
             <a:endParaRPr lang="fr-FR"/>
           </a:p>
@@ -1571,7 +1571,7 @@
           <a:p>
             <a:fld id="{F699991C-361E-EA40-B5C3-147A8933D896}" type="datetimeFigureOut">
               <a:rPr lang="fr-FR" smtClean="0"/>
-              <a:t>24/08/2022</a:t>
+              <a:t>27/08/2022</a:t>
             </a:fld>
             <a:endParaRPr lang="fr-FR"/>
           </a:p>
@@ -1613,7 +1613,7 @@
           <a:p>
             <a:fld id="{596509D5-3574-EE46-B46C-156665145D44}" type="slidenum">
               <a:rPr lang="fr-FR" smtClean="0"/>
-              <a:t>‹N°›</a:t>
+              <a:t>‹#›</a:t>
             </a:fld>
             <a:endParaRPr lang="fr-FR"/>
           </a:p>
@@ -1666,7 +1666,7 @@
           <a:p>
             <a:fld id="{F699991C-361E-EA40-B5C3-147A8933D896}" type="datetimeFigureOut">
               <a:rPr lang="fr-FR" smtClean="0"/>
-              <a:t>24/08/2022</a:t>
+              <a:t>27/08/2022</a:t>
             </a:fld>
             <a:endParaRPr lang="fr-FR"/>
           </a:p>
@@ -1708,7 +1708,7 @@
           <a:p>
             <a:fld id="{596509D5-3574-EE46-B46C-156665145D44}" type="slidenum">
               <a:rPr lang="fr-FR" smtClean="0"/>
-              <a:t>‹N°›</a:t>
+              <a:t>‹#›</a:t>
             </a:fld>
             <a:endParaRPr lang="fr-FR"/>
           </a:p>
@@ -1924,7 +1924,7 @@
           <a:p>
             <a:fld id="{F699991C-361E-EA40-B5C3-147A8933D896}" type="datetimeFigureOut">
               <a:rPr lang="fr-FR" smtClean="0"/>
-              <a:t>24/08/2022</a:t>
+              <a:t>27/08/2022</a:t>
             </a:fld>
             <a:endParaRPr lang="fr-FR"/>
           </a:p>
@@ -1966,7 +1966,7 @@
           <a:p>
             <a:fld id="{596509D5-3574-EE46-B46C-156665145D44}" type="slidenum">
               <a:rPr lang="fr-FR" smtClean="0"/>
-              <a:t>‹N°›</a:t>
+              <a:t>‹#›</a:t>
             </a:fld>
             <a:endParaRPr lang="fr-FR"/>
           </a:p>
@@ -2186,7 +2186,7 @@
           <a:p>
             <a:fld id="{F699991C-361E-EA40-B5C3-147A8933D896}" type="datetimeFigureOut">
               <a:rPr lang="fr-FR" smtClean="0"/>
-              <a:t>24/08/2022</a:t>
+              <a:t>27/08/2022</a:t>
             </a:fld>
             <a:endParaRPr lang="fr-FR"/>
           </a:p>
@@ -2228,7 +2228,7 @@
           <a:p>
             <a:fld id="{596509D5-3574-EE46-B46C-156665145D44}" type="slidenum">
               <a:rPr lang="fr-FR" smtClean="0"/>
-              <a:t>‹N°›</a:t>
+              <a:t>‹#›</a:t>
             </a:fld>
             <a:endParaRPr lang="fr-FR"/>
           </a:p>
@@ -2375,7 +2375,7 @@
           <a:p>
             <a:fld id="{F699991C-361E-EA40-B5C3-147A8933D896}" type="datetimeFigureOut">
               <a:rPr lang="fr-FR" smtClean="0"/>
-              <a:t>24/08/2022</a:t>
+              <a:t>27/08/2022</a:t>
             </a:fld>
             <a:endParaRPr lang="fr-FR"/>
           </a:p>
@@ -2453,7 +2453,7 @@
           <a:p>
             <a:fld id="{596509D5-3574-EE46-B46C-156665145D44}" type="slidenum">
               <a:rPr lang="fr-FR" smtClean="0"/>
-              <a:t>‹N°›</a:t>
+              <a:t>‹#›</a:t>
             </a:fld>
             <a:endParaRPr lang="fr-FR"/>
           </a:p>
@@ -2766,6 +2766,16 @@
 <file path=ppt/slides/slide1.xml><?xml version="1.0" encoding="utf-8"?>
 <p:sld xmlns:a="http://schemas.openxmlformats.org/drawingml/2006/main" xmlns:r="http://schemas.openxmlformats.org/officeDocument/2006/relationships" xmlns:p="http://schemas.openxmlformats.org/presentationml/2006/main">
   <p:cSld>
+    <p:bg>
+      <p:bgPr>
+        <a:solidFill>
+          <a:srgbClr val="EAD3B2">
+            <a:alpha val="81000"/>
+          </a:srgbClr>
+        </a:solidFill>
+        <a:effectLst/>
+      </p:bgPr>
+    </p:bg>
     <p:spTree>
       <p:nvGrpSpPr>
         <p:cNvPr id="1" name=""/>
@@ -2943,7 +2953,7 @@
         </p:blipFill>
         <p:spPr>
           <a:xfrm>
-            <a:off x="10041805" y="6369319"/>
+            <a:off x="9229955" y="6689280"/>
             <a:ext cx="2735261" cy="1083774"/>
           </a:xfrm>
           <a:prstGeom prst="rect">
@@ -2973,7 +2983,7 @@
         </p:blipFill>
         <p:spPr>
           <a:xfrm>
-            <a:off x="2541664" y="8406914"/>
+            <a:off x="634251" y="8180693"/>
             <a:ext cx="3037840" cy="2097741"/>
           </a:xfrm>
           <a:prstGeom prst="rect">
@@ -2995,7 +3005,7 @@
         </p:nvSpPr>
         <p:spPr>
           <a:xfrm>
-            <a:off x="2694064" y="10668120"/>
+            <a:off x="770826" y="10635225"/>
             <a:ext cx="3037840" cy="1315104"/>
           </a:xfrm>
           <a:prstGeom prst="rect">
@@ -3101,7 +3111,7 @@
         </p:blipFill>
         <p:spPr>
           <a:xfrm>
-            <a:off x="1652664" y="6457949"/>
+            <a:off x="814719" y="6457949"/>
             <a:ext cx="5714745" cy="1315105"/>
           </a:xfrm>
           <a:prstGeom prst="rect">
@@ -3161,7 +3171,7 @@
         </p:blipFill>
         <p:spPr>
           <a:xfrm>
-            <a:off x="9304261" y="15540371"/>
+            <a:off x="7674769" y="16096980"/>
             <a:ext cx="2384425" cy="975996"/>
           </a:xfrm>
           <a:prstGeom prst="rect">
@@ -3314,6 +3324,182 @@
           </a:p>
         </p:txBody>
       </p:sp>
+      <p:pic>
+        <p:nvPicPr>
+          <p:cNvPr id="8" name="Picture 7">
+            <a:extLst>
+              <a:ext uri="{FF2B5EF4-FFF2-40B4-BE49-F238E27FC236}">
+                <a16:creationId xmlns:a16="http://schemas.microsoft.com/office/drawing/2014/main" id="{75E1EED4-6788-3859-ED76-A09B2F44337A}"/>
+              </a:ext>
+            </a:extLst>
+          </p:cNvPr>
+          <p:cNvPicPr>
+            <a:picLocks noChangeAspect="1"/>
+          </p:cNvPicPr>
+          <p:nvPr/>
+        </p:nvPicPr>
+        <p:blipFill>
+          <a:blip r:embed="rId9"/>
+          <a:stretch>
+            <a:fillRect/>
+          </a:stretch>
+        </p:blipFill>
+        <p:spPr>
+          <a:xfrm>
+            <a:off x="3491624" y="17155257"/>
+            <a:ext cx="1442720" cy="817581"/>
+          </a:xfrm>
+          <a:prstGeom prst="rect">
+            <a:avLst/>
+          </a:prstGeom>
+        </p:spPr>
+      </p:pic>
+      <p:sp>
+        <p:nvSpPr>
+          <p:cNvPr id="9" name="TextBox 8">
+            <a:extLst>
+              <a:ext uri="{FF2B5EF4-FFF2-40B4-BE49-F238E27FC236}">
+                <a16:creationId xmlns:a16="http://schemas.microsoft.com/office/drawing/2014/main" id="{19D6E326-6573-3A5A-6ED3-F9EB9417AFE7}"/>
+              </a:ext>
+            </a:extLst>
+          </p:cNvPr>
+          <p:cNvSpPr txBox="1"/>
+          <p:nvPr/>
+        </p:nvSpPr>
+        <p:spPr>
+          <a:xfrm>
+            <a:off x="3583064" y="18574346"/>
+            <a:ext cx="1781416" cy="323165"/>
+          </a:xfrm>
+          <a:prstGeom prst="rect">
+            <a:avLst/>
+          </a:prstGeom>
+          <a:noFill/>
+        </p:spPr>
+        <p:txBody>
+          <a:bodyPr wrap="square" rtlCol="0">
+            <a:spAutoFit/>
+          </a:bodyPr>
+          <a:lstStyle/>
+          <a:p>
+            <a:r>
+              <a:rPr lang="fr-FR" sz="1500" dirty="0"/>
+              <a:t>Castelli, p. 538.</a:t>
+            </a:r>
+            <a:endParaRPr lang="en-GB" sz="1500" dirty="0"/>
+          </a:p>
+        </p:txBody>
+      </p:sp>
+      <p:sp>
+        <p:nvSpPr>
+          <p:cNvPr id="10" name="TextBox 9">
+            <a:extLst>
+              <a:ext uri="{FF2B5EF4-FFF2-40B4-BE49-F238E27FC236}">
+                <a16:creationId xmlns:a16="http://schemas.microsoft.com/office/drawing/2014/main" id="{8CF46903-9A99-56F6-45FD-9E8F602189EC}"/>
+              </a:ext>
+            </a:extLst>
+          </p:cNvPr>
+          <p:cNvSpPr txBox="1"/>
+          <p:nvPr/>
+        </p:nvSpPr>
+        <p:spPr>
+          <a:xfrm>
+            <a:off x="5025784" y="16278846"/>
+            <a:ext cx="1598536" cy="553998"/>
+          </a:xfrm>
+          <a:prstGeom prst="rect">
+            <a:avLst/>
+          </a:prstGeom>
+          <a:noFill/>
+        </p:spPr>
+        <p:txBody>
+          <a:bodyPr wrap="square" rtlCol="0">
+            <a:spAutoFit/>
+          </a:bodyPr>
+          <a:lstStyle/>
+          <a:p>
+            <a:r>
+              <a:rPr lang="fr-FR" sz="1500" dirty="0"/>
+              <a:t>James </a:t>
+            </a:r>
+            <a:r>
+              <a:rPr lang="fr-FR" sz="1500" dirty="0" err="1"/>
+              <a:t>fr</a:t>
+            </a:r>
+            <a:r>
+              <a:rPr lang="fr-FR" sz="1500" dirty="0"/>
+              <a:t>, vol. 5, p. 59. </a:t>
+            </a:r>
+            <a:endParaRPr lang="en-GB" sz="1500" dirty="0"/>
+          </a:p>
+        </p:txBody>
+      </p:sp>
+      <p:sp>
+        <p:nvSpPr>
+          <p:cNvPr id="11" name="TextBox 10">
+            <a:extLst>
+              <a:ext uri="{FF2B5EF4-FFF2-40B4-BE49-F238E27FC236}">
+                <a16:creationId xmlns:a16="http://schemas.microsoft.com/office/drawing/2014/main" id="{63B8890F-D739-66AB-E6C3-07A85A2634F9}"/>
+              </a:ext>
+            </a:extLst>
+          </p:cNvPr>
+          <p:cNvSpPr txBox="1"/>
+          <p:nvPr/>
+        </p:nvSpPr>
+        <p:spPr>
+          <a:xfrm>
+            <a:off x="7827144" y="11316612"/>
+            <a:ext cx="2560320" cy="553998"/>
+          </a:xfrm>
+          <a:prstGeom prst="rect">
+            <a:avLst/>
+          </a:prstGeom>
+          <a:noFill/>
+        </p:spPr>
+        <p:txBody>
+          <a:bodyPr wrap="square" rtlCol="0">
+            <a:spAutoFit/>
+          </a:bodyPr>
+          <a:lstStyle/>
+          <a:p>
+            <a:r>
+              <a:rPr lang="fr-FR" sz="1500" dirty="0"/>
+              <a:t>Tendance à la réduction des ligatures </a:t>
+            </a:r>
+            <a:endParaRPr lang="en-GB" sz="1500" dirty="0"/>
+          </a:p>
+        </p:txBody>
+      </p:sp>
+      <p:pic>
+        <p:nvPicPr>
+          <p:cNvPr id="22" name="Picture 21">
+            <a:extLst>
+              <a:ext uri="{FF2B5EF4-FFF2-40B4-BE49-F238E27FC236}">
+                <a16:creationId xmlns:a16="http://schemas.microsoft.com/office/drawing/2014/main" id="{E4590AA2-C5AE-52CC-4183-DD36A979AD98}"/>
+              </a:ext>
+            </a:extLst>
+          </p:cNvPr>
+          <p:cNvPicPr>
+            <a:picLocks noChangeAspect="1"/>
+          </p:cNvPicPr>
+          <p:nvPr/>
+        </p:nvPicPr>
+        <p:blipFill>
+          <a:blip r:embed="rId10"/>
+          <a:stretch>
+            <a:fillRect/>
+          </a:stretch>
+        </p:blipFill>
+        <p:spPr>
+          <a:xfrm>
+            <a:off x="4782039" y="9634662"/>
+            <a:ext cx="7975183" cy="1498626"/>
+          </a:xfrm>
+          <a:prstGeom prst="rect">
+            <a:avLst/>
+          </a:prstGeom>
+        </p:spPr>
+      </p:pic>
     </p:spTree>
     <p:extLst>
       <p:ext uri="{BB962C8B-B14F-4D97-AF65-F5344CB8AC3E}">

</xml_diff>